<commit_message>
Added RA3 , number of awardees, and max and min award. Max and min are not really what I want and I need to redo them.
</commit_message>
<xml_diff>
--- a/Documents/Basic Scholarship Awarding Graphs.pptx
+++ b/Documents/Basic Scholarship Awarding Graphs.pptx
@@ -6897,18 +6897,35 @@
         </p:nvSpPr>
         <p:spPr/>
         <p:txBody>
-          <a:bodyPr/>
-          <a:lstStyle/>
-          <a:p>
-            <a:r>
-              <a:rPr lang="en-US" dirty="0" smtClean="0"/>
-              <a:t>RA1-The higher ranked applicant will be awarded more than the next highest ranked applicant</a:t>
-            </a:r>
-          </a:p>
-          <a:p>
-            <a:r>
-              <a:rPr lang="en-US" dirty="0" smtClean="0"/>
-              <a:t>RA2-That if a lower ranked applicant would have a award that every higher ranked applicant would have an award</a:t>
+          <a:bodyPr>
+            <a:normAutofit fontScale="92500" lnSpcReduction="20000"/>
+          </a:bodyPr>
+          <a:lstStyle/>
+          <a:p>
+            <a:r>
+              <a:rPr lang="en-US" dirty="0" smtClean="0"/>
+              <a:t>RA1-The higher ranked applicant will be awarded more than the next highest ranked </a:t>
+            </a:r>
+            <a:r>
+              <a:rPr lang="en-US" dirty="0" smtClean="0"/>
+              <a:t>applicant</a:t>
+            </a:r>
+          </a:p>
+          <a:p>
+            <a:r>
+              <a:rPr lang="en-US" dirty="0" smtClean="0"/>
+              <a:t>RA2-That a lower ranked applicant would not have more than the next highest ranked applicant. In other words, sequential ranked applicants can have the same amount, e.g. -1 has 1000 and 2 has 1000.</a:t>
+            </a:r>
+            <a:endParaRPr lang="en-US" dirty="0" smtClean="0"/>
+          </a:p>
+          <a:p>
+            <a:r>
+              <a:rPr lang="en-US" dirty="0" smtClean="0"/>
+              <a:t>RA3-That </a:t>
+            </a:r>
+            <a:r>
+              <a:rPr lang="en-US" dirty="0" smtClean="0"/>
+              <a:t>if a lower ranked applicant would have a award that every higher ranked applicant would have an award</a:t>
             </a:r>
           </a:p>
           <a:p>
@@ -6920,7 +6937,19 @@
           <a:p>
             <a:r>
               <a:rPr lang="en-US" dirty="0" smtClean="0"/>
-              <a:t>However, if RA1 holds true, then RA2 must be </a:t>
+              <a:t>However, if RA1 holds true, then </a:t>
+            </a:r>
+            <a:r>
+              <a:rPr lang="en-US" dirty="0" smtClean="0"/>
+              <a:t>RA2 </a:t>
+            </a:r>
+            <a:r>
+              <a:rPr lang="en-US" smtClean="0"/>
+              <a:t>and RA3 must </a:t>
+            </a:r>
+            <a:r>
+              <a:rPr lang="en-US" dirty="0" smtClean="0"/>
+              <a:t>be </a:t>
             </a:r>
             <a:r>
               <a:rPr lang="en-US" dirty="0" smtClean="0"/>

</xml_diff>

<commit_message>
Rebooting need to save this
</commit_message>
<xml_diff>
--- a/Documents/Basic Scholarship Awarding Graphs.pptx
+++ b/Documents/Basic Scholarship Awarding Graphs.pptx
@@ -6941,11 +6941,7 @@
             </a:r>
             <a:r>
               <a:rPr lang="en-US" dirty="0" smtClean="0"/>
-              <a:t>RA2 </a:t>
-            </a:r>
-            <a:r>
-              <a:rPr lang="en-US" smtClean="0"/>
-              <a:t>and RA3 must </a:t>
+              <a:t>RA2 and RA3 must </a:t>
             </a:r>
             <a:r>
               <a:rPr lang="en-US" dirty="0" smtClean="0"/>
@@ -7987,7 +7983,7 @@
         <p:spPr>
           <a:xfrm>
             <a:off x="2286000" y="5721928"/>
-            <a:ext cx="1399309" cy="646331"/>
+            <a:ext cx="1399309" cy="923330"/>
           </a:xfrm>
           <a:prstGeom prst="rect">
             <a:avLst/>
@@ -8008,7 +8004,17 @@
           <a:p>
             <a:r>
               <a:rPr lang="en-US" dirty="0" smtClean="0"/>
-              <a:t>RA2- True</a:t>
+              <a:t>RA2- </a:t>
+            </a:r>
+            <a:r>
+              <a:rPr lang="en-US" dirty="0" smtClean="0"/>
+              <a:t>False</a:t>
+            </a:r>
+          </a:p>
+          <a:p>
+            <a:r>
+              <a:rPr lang="en-US" dirty="0" smtClean="0"/>
+              <a:t>RA3-True</a:t>
             </a:r>
             <a:endParaRPr lang="en-US" dirty="0"/>
           </a:p>
@@ -9084,7 +9090,7 @@
         <p:spPr>
           <a:xfrm>
             <a:off x="2286000" y="5721928"/>
-            <a:ext cx="1399309" cy="646331"/>
+            <a:ext cx="1399309" cy="923330"/>
           </a:xfrm>
           <a:prstGeom prst="rect">
             <a:avLst/>
@@ -9105,7 +9111,17 @@
           <a:p>
             <a:r>
               <a:rPr lang="en-US" dirty="0" smtClean="0"/>
-              <a:t>RA2- True</a:t>
+              <a:t>RA2- </a:t>
+            </a:r>
+            <a:r>
+              <a:rPr lang="en-US" dirty="0" smtClean="0"/>
+              <a:t>False</a:t>
+            </a:r>
+          </a:p>
+          <a:p>
+            <a:r>
+              <a:rPr lang="en-US" dirty="0" smtClean="0"/>
+              <a:t>RA3-True</a:t>
             </a:r>
             <a:endParaRPr lang="en-US" dirty="0"/>
           </a:p>
@@ -10279,7 +10295,7 @@
         <p:spPr>
           <a:xfrm>
             <a:off x="2286000" y="5721928"/>
-            <a:ext cx="1399309" cy="646331"/>
+            <a:ext cx="1399309" cy="923330"/>
           </a:xfrm>
           <a:prstGeom prst="rect">
             <a:avLst/>
@@ -10300,7 +10316,17 @@
           <a:p>
             <a:r>
               <a:rPr lang="en-US" dirty="0" smtClean="0"/>
-              <a:t>RA2- True</a:t>
+              <a:t>RA2- </a:t>
+            </a:r>
+            <a:r>
+              <a:rPr lang="en-US" dirty="0" smtClean="0"/>
+              <a:t>True</a:t>
+            </a:r>
+          </a:p>
+          <a:p>
+            <a:r>
+              <a:rPr lang="en-US" dirty="0" smtClean="0"/>
+              <a:t>RA3-True</a:t>
             </a:r>
             <a:endParaRPr lang="en-US" dirty="0"/>
           </a:p>
@@ -11505,7 +11531,7 @@
         <p:spPr>
           <a:xfrm>
             <a:off x="2286000" y="5721928"/>
-            <a:ext cx="1399309" cy="646331"/>
+            <a:ext cx="1399309" cy="923330"/>
           </a:xfrm>
           <a:prstGeom prst="rect">
             <a:avLst/>
@@ -11526,7 +11552,17 @@
           <a:p>
             <a:r>
               <a:rPr lang="en-US" dirty="0" smtClean="0"/>
-              <a:t>RA2- True</a:t>
+              <a:t>RA2- </a:t>
+            </a:r>
+            <a:r>
+              <a:rPr lang="en-US" dirty="0" smtClean="0"/>
+              <a:t>True</a:t>
+            </a:r>
+          </a:p>
+          <a:p>
+            <a:r>
+              <a:rPr lang="en-US" dirty="0" smtClean="0"/>
+              <a:t>RA3-True</a:t>
             </a:r>
             <a:endParaRPr lang="en-US" dirty="0"/>
           </a:p>

</xml_diff>